<commit_message>
Increasing efficiency of bootstrap process with joleen.
Signed-off-by: joel <joel.tay.2016@sis.smu.edu.sg>
</commit_message>
<xml_diff>
--- a/presentations/Project Management Review 4th OctoberFINAL.pptx
+++ b/presentations/Project Management Review 4th OctoberFINAL.pptx
@@ -1073,7 +1073,7 @@
           <a:p>
             <a:fld id="{6785AE29-4F7C-4CA5-B98B-C82289292C99}" type="datetimeFigureOut">
               <a:rPr lang="en-SG" smtClean="0"/>
-              <a:t>8/10/2017</a:t>
+              <a:t>10/10/2017</a:t>
             </a:fld>
             <a:endParaRPr lang="en-SG"/>
           </a:p>
@@ -2888,7 +2888,7 @@
           <a:p>
             <a:fld id="{763E9024-17DE-4849-9A54-007B8F15ADFE}" type="datetimeFigureOut">
               <a:rPr lang="en-SG" smtClean="0"/>
-              <a:t>8/10/2017</a:t>
+              <a:t>10/10/2017</a:t>
             </a:fld>
             <a:endParaRPr lang="en-SG"/>
           </a:p>
@@ -3226,7 +3226,7 @@
           <a:p>
             <a:fld id="{763E9024-17DE-4849-9A54-007B8F15ADFE}" type="datetimeFigureOut">
               <a:rPr lang="en-SG" smtClean="0"/>
-              <a:t>8/10/2017</a:t>
+              <a:t>10/10/2017</a:t>
             </a:fld>
             <a:endParaRPr lang="en-SG"/>
           </a:p>
@@ -3627,7 +3627,7 @@
           <a:p>
             <a:fld id="{763E9024-17DE-4849-9A54-007B8F15ADFE}" type="datetimeFigureOut">
               <a:rPr lang="en-SG" smtClean="0"/>
-              <a:t>8/10/2017</a:t>
+              <a:t>10/10/2017</a:t>
             </a:fld>
             <a:endParaRPr lang="en-SG"/>
           </a:p>
@@ -3963,7 +3963,7 @@
           <a:p>
             <a:fld id="{763E9024-17DE-4849-9A54-007B8F15ADFE}" type="datetimeFigureOut">
               <a:rPr lang="en-SG" smtClean="0"/>
-              <a:t>8/10/2017</a:t>
+              <a:t>10/10/2017</a:t>
             </a:fld>
             <a:endParaRPr lang="en-SG"/>
           </a:p>
@@ -4283,7 +4283,7 @@
           <a:p>
             <a:fld id="{763E9024-17DE-4849-9A54-007B8F15ADFE}" type="datetimeFigureOut">
               <a:rPr lang="en-SG" smtClean="0"/>
-              <a:t>8/10/2017</a:t>
+              <a:t>10/10/2017</a:t>
             </a:fld>
             <a:endParaRPr lang="en-SG"/>
           </a:p>
@@ -4679,7 +4679,7 @@
           <a:p>
             <a:fld id="{763E9024-17DE-4849-9A54-007B8F15ADFE}" type="datetimeFigureOut">
               <a:rPr lang="en-SG" smtClean="0"/>
-              <a:t>8/10/2017</a:t>
+              <a:t>10/10/2017</a:t>
             </a:fld>
             <a:endParaRPr lang="en-SG"/>
           </a:p>
@@ -4936,7 +4936,7 @@
           <a:p>
             <a:fld id="{763E9024-17DE-4849-9A54-007B8F15ADFE}" type="datetimeFigureOut">
               <a:rPr lang="en-SG" smtClean="0"/>
-              <a:t>8/10/2017</a:t>
+              <a:t>10/10/2017</a:t>
             </a:fld>
             <a:endParaRPr lang="en-SG"/>
           </a:p>
@@ -5198,7 +5198,7 @@
           <a:p>
             <a:fld id="{763E9024-17DE-4849-9A54-007B8F15ADFE}" type="datetimeFigureOut">
               <a:rPr lang="en-SG" smtClean="0"/>
-              <a:t>8/10/2017</a:t>
+              <a:t>10/10/2017</a:t>
             </a:fld>
             <a:endParaRPr lang="en-SG"/>
           </a:p>
@@ -5460,7 +5460,7 @@
           <a:p>
             <a:fld id="{763E9024-17DE-4849-9A54-007B8F15ADFE}" type="datetimeFigureOut">
               <a:rPr lang="en-SG" smtClean="0"/>
-              <a:t>8/10/2017</a:t>
+              <a:t>10/10/2017</a:t>
             </a:fld>
             <a:endParaRPr lang="en-SG"/>
           </a:p>
@@ -5789,7 +5789,7 @@
           <a:p>
             <a:fld id="{763E9024-17DE-4849-9A54-007B8F15ADFE}" type="datetimeFigureOut">
               <a:rPr lang="en-SG" smtClean="0"/>
-              <a:t>8/10/2017</a:t>
+              <a:t>10/10/2017</a:t>
             </a:fld>
             <a:endParaRPr lang="en-SG"/>
           </a:p>
@@ -6112,7 +6112,7 @@
           <a:p>
             <a:fld id="{763E9024-17DE-4849-9A54-007B8F15ADFE}" type="datetimeFigureOut">
               <a:rPr lang="en-SG" smtClean="0"/>
-              <a:t>8/10/2017</a:t>
+              <a:t>10/10/2017</a:t>
             </a:fld>
             <a:endParaRPr lang="en-SG"/>
           </a:p>
@@ -6569,7 +6569,7 @@
           <a:p>
             <a:fld id="{763E9024-17DE-4849-9A54-007B8F15ADFE}" type="datetimeFigureOut">
               <a:rPr lang="en-SG" smtClean="0"/>
-              <a:t>8/10/2017</a:t>
+              <a:t>10/10/2017</a:t>
             </a:fld>
             <a:endParaRPr lang="en-SG"/>
           </a:p>
@@ -6774,7 +6774,7 @@
           <a:p>
             <a:fld id="{763E9024-17DE-4849-9A54-007B8F15ADFE}" type="datetimeFigureOut">
               <a:rPr lang="en-SG" smtClean="0"/>
-              <a:t>8/10/2017</a:t>
+              <a:t>10/10/2017</a:t>
             </a:fld>
             <a:endParaRPr lang="en-SG"/>
           </a:p>
@@ -6951,7 +6951,7 @@
           <a:p>
             <a:fld id="{763E9024-17DE-4849-9A54-007B8F15ADFE}" type="datetimeFigureOut">
               <a:rPr lang="en-SG" smtClean="0"/>
-              <a:t>8/10/2017</a:t>
+              <a:t>10/10/2017</a:t>
             </a:fld>
             <a:endParaRPr lang="en-SG"/>
           </a:p>
@@ -7284,7 +7284,7 @@
           <a:p>
             <a:fld id="{763E9024-17DE-4849-9A54-007B8F15ADFE}" type="datetimeFigureOut">
               <a:rPr lang="en-SG" smtClean="0"/>
-              <a:t>8/10/2017</a:t>
+              <a:t>10/10/2017</a:t>
             </a:fld>
             <a:endParaRPr lang="en-SG"/>
           </a:p>
@@ -7629,7 +7629,7 @@
           <a:p>
             <a:fld id="{763E9024-17DE-4849-9A54-007B8F15ADFE}" type="datetimeFigureOut">
               <a:rPr lang="en-SG" smtClean="0"/>
-              <a:t>8/10/2017</a:t>
+              <a:t>10/10/2017</a:t>
             </a:fld>
             <a:endParaRPr lang="en-SG"/>
           </a:p>
@@ -9746,7 +9746,7 @@
           <a:p>
             <a:fld id="{763E9024-17DE-4849-9A54-007B8F15ADFE}" type="datetimeFigureOut">
               <a:rPr lang="en-SG" smtClean="0"/>
-              <a:t>8/10/2017</a:t>
+              <a:t>10/10/2017</a:t>
             </a:fld>
             <a:endParaRPr lang="en-SG"/>
           </a:p>
@@ -25911,7 +25911,7 @@
           <a:p>
             <a:pPr algn="ctr"/>
             <a:r>
-              <a:rPr lang="en-SG" sz="1600" b="1" dirty="0"/>
+              <a:rPr lang="en-SG" sz="1400" b="1" dirty="0"/>
               <a:t>Integrate improved UI with previous functions (1 day)</a:t>
             </a:r>
           </a:p>

</xml_diff>